<commit_message>
Update presentation and create report
</commit_message>
<xml_diff>
--- a/Applied Data Science Capstone - The Battle of the Neighbourhoods - Presentation.pptx
+++ b/Applied Data Science Capstone - The Battle of the Neighbourhoods - Presentation.pptx
@@ -842,7 +842,7 @@
           <a:p>
             <a:fld id="{CFACA3C5-AB8A-4AC3-84D0-7183E245AE04}" type="datetimeFigureOut">
               <a:rPr lang="en-GB" smtClean="0"/>
-              <a:t>08/10/2019</a:t>
+              <a:t>09/10/2019</a:t>
             </a:fld>
             <a:endParaRPr lang="en-GB"/>
           </a:p>
@@ -1093,7 +1093,7 @@
           <a:p>
             <a:fld id="{CFACA3C5-AB8A-4AC3-84D0-7183E245AE04}" type="datetimeFigureOut">
               <a:rPr lang="en-GB" smtClean="0"/>
-              <a:t>08/10/2019</a:t>
+              <a:t>09/10/2019</a:t>
             </a:fld>
             <a:endParaRPr lang="en-GB"/>
           </a:p>
@@ -1407,7 +1407,7 @@
           <a:p>
             <a:fld id="{CFACA3C5-AB8A-4AC3-84D0-7183E245AE04}" type="datetimeFigureOut">
               <a:rPr lang="en-GB" smtClean="0"/>
-              <a:t>08/10/2019</a:t>
+              <a:t>09/10/2019</a:t>
             </a:fld>
             <a:endParaRPr lang="en-GB"/>
           </a:p>
@@ -1748,7 +1748,7 @@
           <a:p>
             <a:fld id="{CFACA3C5-AB8A-4AC3-84D0-7183E245AE04}" type="datetimeFigureOut">
               <a:rPr lang="en-GB" smtClean="0"/>
-              <a:t>08/10/2019</a:t>
+              <a:t>09/10/2019</a:t>
             </a:fld>
             <a:endParaRPr lang="en-GB"/>
           </a:p>
@@ -2062,7 +2062,7 @@
           <a:p>
             <a:fld id="{CFACA3C5-AB8A-4AC3-84D0-7183E245AE04}" type="datetimeFigureOut">
               <a:rPr lang="en-GB" smtClean="0"/>
-              <a:t>08/10/2019</a:t>
+              <a:t>09/10/2019</a:t>
             </a:fld>
             <a:endParaRPr lang="en-GB"/>
           </a:p>
@@ -2455,7 +2455,7 @@
           <a:p>
             <a:fld id="{CFACA3C5-AB8A-4AC3-84D0-7183E245AE04}" type="datetimeFigureOut">
               <a:rPr lang="en-GB" smtClean="0"/>
-              <a:t>08/10/2019</a:t>
+              <a:t>09/10/2019</a:t>
             </a:fld>
             <a:endParaRPr lang="en-GB"/>
           </a:p>
@@ -2625,7 +2625,7 @@
           <a:p>
             <a:fld id="{CFACA3C5-AB8A-4AC3-84D0-7183E245AE04}" type="datetimeFigureOut">
               <a:rPr lang="en-GB" smtClean="0"/>
-              <a:t>08/10/2019</a:t>
+              <a:t>09/10/2019</a:t>
             </a:fld>
             <a:endParaRPr lang="en-GB"/>
           </a:p>
@@ -2805,7 +2805,7 @@
           <a:p>
             <a:fld id="{CFACA3C5-AB8A-4AC3-84D0-7183E245AE04}" type="datetimeFigureOut">
               <a:rPr lang="en-GB" smtClean="0"/>
-              <a:t>08/10/2019</a:t>
+              <a:t>09/10/2019</a:t>
             </a:fld>
             <a:endParaRPr lang="en-GB"/>
           </a:p>
@@ -3590,7 +3590,7 @@
           <a:p>
             <a:fld id="{CFACA3C5-AB8A-4AC3-84D0-7183E245AE04}" type="datetimeFigureOut">
               <a:rPr lang="en-GB" smtClean="0"/>
-              <a:t>08/10/2019</a:t>
+              <a:t>09/10/2019</a:t>
             </a:fld>
             <a:endParaRPr lang="en-GB"/>
           </a:p>
@@ -3766,7 +3766,7 @@
           <a:p>
             <a:fld id="{CFACA3C5-AB8A-4AC3-84D0-7183E245AE04}" type="datetimeFigureOut">
               <a:rPr lang="en-GB" smtClean="0"/>
-              <a:t>08/10/2019</a:t>
+              <a:t>09/10/2019</a:t>
             </a:fld>
             <a:endParaRPr lang="en-GB"/>
           </a:p>
@@ -4013,7 +4013,7 @@
           <a:p>
             <a:fld id="{CFACA3C5-AB8A-4AC3-84D0-7183E245AE04}" type="datetimeFigureOut">
               <a:rPr lang="en-GB" smtClean="0"/>
-              <a:t>08/10/2019</a:t>
+              <a:t>09/10/2019</a:t>
             </a:fld>
             <a:endParaRPr lang="en-GB"/>
           </a:p>
@@ -4189,7 +4189,7 @@
           <a:p>
             <a:fld id="{CFACA3C5-AB8A-4AC3-84D0-7183E245AE04}" type="datetimeFigureOut">
               <a:rPr lang="en-GB" smtClean="0"/>
-              <a:t>08/10/2019</a:t>
+              <a:t>09/10/2019</a:t>
             </a:fld>
             <a:endParaRPr lang="en-GB"/>
           </a:p>
@@ -4421,7 +4421,7 @@
           <a:p>
             <a:fld id="{CFACA3C5-AB8A-4AC3-84D0-7183E245AE04}" type="datetimeFigureOut">
               <a:rPr lang="en-GB" smtClean="0"/>
-              <a:t>08/10/2019</a:t>
+              <a:t>09/10/2019</a:t>
             </a:fld>
             <a:endParaRPr lang="en-GB"/>
           </a:p>
@@ -4795,7 +4795,7 @@
           <a:p>
             <a:fld id="{CFACA3C5-AB8A-4AC3-84D0-7183E245AE04}" type="datetimeFigureOut">
               <a:rPr lang="en-GB" smtClean="0"/>
-              <a:t>08/10/2019</a:t>
+              <a:t>09/10/2019</a:t>
             </a:fld>
             <a:endParaRPr lang="en-GB"/>
           </a:p>
@@ -4918,7 +4918,7 @@
           <a:p>
             <a:fld id="{CFACA3C5-AB8A-4AC3-84D0-7183E245AE04}" type="datetimeFigureOut">
               <a:rPr lang="en-GB" smtClean="0"/>
-              <a:t>08/10/2019</a:t>
+              <a:t>09/10/2019</a:t>
             </a:fld>
             <a:endParaRPr lang="en-GB"/>
           </a:p>
@@ -5013,7 +5013,7 @@
           <a:p>
             <a:fld id="{CFACA3C5-AB8A-4AC3-84D0-7183E245AE04}" type="datetimeFigureOut">
               <a:rPr lang="en-GB" smtClean="0"/>
-              <a:t>08/10/2019</a:t>
+              <a:t>09/10/2019</a:t>
             </a:fld>
             <a:endParaRPr lang="en-GB"/>
           </a:p>
@@ -5268,7 +5268,7 @@
           <a:p>
             <a:fld id="{CFACA3C5-AB8A-4AC3-84D0-7183E245AE04}" type="datetimeFigureOut">
               <a:rPr lang="en-GB" smtClean="0"/>
-              <a:t>08/10/2019</a:t>
+              <a:t>09/10/2019</a:t>
             </a:fld>
             <a:endParaRPr lang="en-GB"/>
           </a:p>
@@ -5531,7 +5531,7 @@
           <a:p>
             <a:fld id="{CFACA3C5-AB8A-4AC3-84D0-7183E245AE04}" type="datetimeFigureOut">
               <a:rPr lang="en-GB" smtClean="0"/>
-              <a:t>08/10/2019</a:t>
+              <a:t>09/10/2019</a:t>
             </a:fld>
             <a:endParaRPr lang="en-GB"/>
           </a:p>
@@ -5782,7 +5782,7 @@
           <a:p>
             <a:fld id="{CFACA3C5-AB8A-4AC3-84D0-7183E245AE04}" type="datetimeFigureOut">
               <a:rPr lang="en-GB" smtClean="0"/>
-              <a:t>08/10/2019</a:t>
+              <a:t>09/10/2019</a:t>
             </a:fld>
             <a:endParaRPr lang="en-GB"/>
           </a:p>
@@ -6096,7 +6096,7 @@
           <a:p>
             <a:fld id="{CFACA3C5-AB8A-4AC3-84D0-7183E245AE04}" type="datetimeFigureOut">
               <a:rPr lang="en-GB" smtClean="0"/>
-              <a:t>08/10/2019</a:t>
+              <a:t>09/10/2019</a:t>
             </a:fld>
             <a:endParaRPr lang="en-GB"/>
           </a:p>
@@ -6423,7 +6423,7 @@
           <a:p>
             <a:fld id="{CFACA3C5-AB8A-4AC3-84D0-7183E245AE04}" type="datetimeFigureOut">
               <a:rPr lang="en-GB" smtClean="0"/>
-              <a:t>08/10/2019</a:t>
+              <a:t>09/10/2019</a:t>
             </a:fld>
             <a:endParaRPr lang="en-GB"/>
           </a:p>
@@ -6737,7 +6737,7 @@
           <a:p>
             <a:fld id="{CFACA3C5-AB8A-4AC3-84D0-7183E245AE04}" type="datetimeFigureOut">
               <a:rPr lang="en-GB" smtClean="0"/>
-              <a:t>08/10/2019</a:t>
+              <a:t>09/10/2019</a:t>
             </a:fld>
             <a:endParaRPr lang="en-GB"/>
           </a:p>
@@ -7060,7 +7060,7 @@
           <a:p>
             <a:fld id="{CFACA3C5-AB8A-4AC3-84D0-7183E245AE04}" type="datetimeFigureOut">
               <a:rPr lang="en-GB" smtClean="0"/>
-              <a:t>08/10/2019</a:t>
+              <a:t>09/10/2019</a:t>
             </a:fld>
             <a:endParaRPr lang="en-GB"/>
           </a:p>
@@ -7371,7 +7371,7 @@
           <a:p>
             <a:fld id="{CFACA3C5-AB8A-4AC3-84D0-7183E245AE04}" type="datetimeFigureOut">
               <a:rPr lang="en-GB" smtClean="0"/>
-              <a:t>08/10/2019</a:t>
+              <a:t>09/10/2019</a:t>
             </a:fld>
             <a:endParaRPr lang="en-GB"/>
           </a:p>
@@ -7541,7 +7541,7 @@
           <a:p>
             <a:fld id="{CFACA3C5-AB8A-4AC3-84D0-7183E245AE04}" type="datetimeFigureOut">
               <a:rPr lang="en-GB" smtClean="0"/>
-              <a:t>08/10/2019</a:t>
+              <a:t>09/10/2019</a:t>
             </a:fld>
             <a:endParaRPr lang="en-GB"/>
           </a:p>
@@ -7721,7 +7721,7 @@
           <a:p>
             <a:fld id="{CFACA3C5-AB8A-4AC3-84D0-7183E245AE04}" type="datetimeFigureOut">
               <a:rPr lang="en-GB" smtClean="0"/>
-              <a:t>08/10/2019</a:t>
+              <a:t>09/10/2019</a:t>
             </a:fld>
             <a:endParaRPr lang="en-GB"/>
           </a:p>
@@ -7953,7 +7953,7 @@
           <a:p>
             <a:fld id="{CFACA3C5-AB8A-4AC3-84D0-7183E245AE04}" type="datetimeFigureOut">
               <a:rPr lang="en-GB" smtClean="0"/>
-              <a:t>08/10/2019</a:t>
+              <a:t>09/10/2019</a:t>
             </a:fld>
             <a:endParaRPr lang="en-GB"/>
           </a:p>
@@ -8327,7 +8327,7 @@
           <a:p>
             <a:fld id="{CFACA3C5-AB8A-4AC3-84D0-7183E245AE04}" type="datetimeFigureOut">
               <a:rPr lang="en-GB" smtClean="0"/>
-              <a:t>08/10/2019</a:t>
+              <a:t>09/10/2019</a:t>
             </a:fld>
             <a:endParaRPr lang="en-GB"/>
           </a:p>
@@ -8450,7 +8450,7 @@
           <a:p>
             <a:fld id="{CFACA3C5-AB8A-4AC3-84D0-7183E245AE04}" type="datetimeFigureOut">
               <a:rPr lang="en-GB" smtClean="0"/>
-              <a:t>08/10/2019</a:t>
+              <a:t>09/10/2019</a:t>
             </a:fld>
             <a:endParaRPr lang="en-GB"/>
           </a:p>
@@ -8545,7 +8545,7 @@
           <a:p>
             <a:fld id="{CFACA3C5-AB8A-4AC3-84D0-7183E245AE04}" type="datetimeFigureOut">
               <a:rPr lang="en-GB" smtClean="0"/>
-              <a:t>08/10/2019</a:t>
+              <a:t>09/10/2019</a:t>
             </a:fld>
             <a:endParaRPr lang="en-GB"/>
           </a:p>
@@ -8800,7 +8800,7 @@
           <a:p>
             <a:fld id="{CFACA3C5-AB8A-4AC3-84D0-7183E245AE04}" type="datetimeFigureOut">
               <a:rPr lang="en-GB" smtClean="0"/>
-              <a:t>08/10/2019</a:t>
+              <a:t>09/10/2019</a:t>
             </a:fld>
             <a:endParaRPr lang="en-GB"/>
           </a:p>
@@ -9063,7 +9063,7 @@
           <a:p>
             <a:fld id="{CFACA3C5-AB8A-4AC3-84D0-7183E245AE04}" type="datetimeFigureOut">
               <a:rPr lang="en-GB" smtClean="0"/>
-              <a:t>08/10/2019</a:t>
+              <a:t>09/10/2019</a:t>
             </a:fld>
             <a:endParaRPr lang="en-GB"/>
           </a:p>
@@ -9806,7 +9806,7 @@
           <a:p>
             <a:fld id="{CFACA3C5-AB8A-4AC3-84D0-7183E245AE04}" type="datetimeFigureOut">
               <a:rPr lang="en-GB" smtClean="0"/>
-              <a:t>08/10/2019</a:t>
+              <a:t>09/10/2019</a:t>
             </a:fld>
             <a:endParaRPr lang="en-GB"/>
           </a:p>
@@ -10997,7 +10997,7 @@
           <a:p>
             <a:fld id="{CFACA3C5-AB8A-4AC3-84D0-7183E245AE04}" type="datetimeFigureOut">
               <a:rPr lang="en-GB" smtClean="0"/>
-              <a:t>08/10/2019</a:t>
+              <a:t>09/10/2019</a:t>
             </a:fld>
             <a:endParaRPr lang="en-GB"/>
           </a:p>
@@ -12303,13 +12303,13 @@
         </p:nvSpPr>
         <p:spPr>
           <a:xfrm>
-            <a:off x="1507067" y="4050833"/>
-            <a:ext cx="7766936" cy="1096899"/>
+            <a:off x="1507067" y="4050834"/>
+            <a:ext cx="7766936" cy="1892766"/>
           </a:xfrm>
         </p:spPr>
         <p:txBody>
           <a:bodyPr>
-            <a:normAutofit/>
+            <a:normAutofit fontScale="92500"/>
           </a:bodyPr>
           <a:lstStyle/>
           <a:p>
@@ -12351,7 +12351,7 @@
                   <a:srgbClr val="FFFFFF"/>
                 </a:solidFill>
               </a:rPr>
-              <a:t>22</a:t>
+              <a:t>9</a:t>
             </a:r>
             <a:r>
               <a:rPr lang="en-GB" baseline="30000" dirty="0">
@@ -12359,7 +12359,7 @@
                   <a:srgbClr val="FFFFFF"/>
                 </a:solidFill>
               </a:rPr>
-              <a:t>nd</a:t>
+              <a:t>th</a:t>
             </a:r>
             <a:r>
               <a:rPr lang="en-GB" dirty="0">
@@ -12367,8 +12367,75 @@
                   <a:srgbClr val="FFFFFF"/>
                 </a:solidFill>
               </a:rPr>
-              <a:t> August, 2019</a:t>
-            </a:r>
+              <a:t> October, 2019</a:t>
+            </a:r>
+          </a:p>
+          <a:p>
+            <a:pPr>
+              <a:lnSpc>
+                <a:spcPct val="90000"/>
+              </a:lnSpc>
+            </a:pPr>
+            <a:endParaRPr lang="en-GB" dirty="0">
+              <a:solidFill>
+                <a:srgbClr val="FFFFFF"/>
+              </a:solidFill>
+            </a:endParaRPr>
+          </a:p>
+          <a:p>
+            <a:pPr>
+              <a:lnSpc>
+                <a:spcPct val="90000"/>
+              </a:lnSpc>
+            </a:pPr>
+            <a:r>
+              <a:rPr lang="en-GB" dirty="0"/>
+              <a:t>Project </a:t>
+            </a:r>
+            <a:r>
+              <a:rPr lang="en-GB" dirty="0" err="1"/>
+              <a:t>github</a:t>
+            </a:r>
+            <a:r>
+              <a:rPr lang="en-GB" dirty="0"/>
+              <a:t> repository</a:t>
+            </a:r>
+            <a:r>
+              <a:rPr lang="en-GB" b="1" dirty="0"/>
+              <a:t>: </a:t>
+            </a:r>
+            <a:r>
+              <a:rPr lang="en-GB" u="sng" dirty="0">
+                <a:solidFill>
+                  <a:srgbClr val="00FFFF"/>
+                </a:solidFill>
+                <a:hlinkClick r:id="rId2">
+                  <a:extLst>
+                    <a:ext uri="{A12FA001-AC4F-418D-AE19-62706E023703}">
+                      <ahyp:hlinkClr xmlns:ahyp="http://schemas.microsoft.com/office/drawing/2018/hyperlinkcolor" val="tx"/>
+                    </a:ext>
+                  </a:extLst>
+                </a:hlinkClick>
+              </a:rPr>
+              <a:t>https://github.com/Sam-Lee1/Coursera_Capstone</a:t>
+            </a:r>
+            <a:endParaRPr lang="en-GB" dirty="0">
+              <a:solidFill>
+                <a:srgbClr val="00FFFF"/>
+              </a:solidFill>
+            </a:endParaRPr>
+          </a:p>
+          <a:p>
+            <a:pPr>
+              <a:lnSpc>
+                <a:spcPct val="90000"/>
+              </a:lnSpc>
+            </a:pPr>
+            <a:endParaRPr lang="en-GB" dirty="0">
+              <a:solidFill>
+                <a:srgbClr val="FFFFFF"/>
+              </a:solidFill>
+            </a:endParaRPr>
           </a:p>
         </p:txBody>
       </p:sp>

</xml_diff>